<commit_message>
Updated a bunch of stuff
</commit_message>
<xml_diff>
--- a/images/Regression_analysis_process.pptx
+++ b/images/Regression_analysis_process.pptx
@@ -104,7 +104,89 @@
       </a:defRPr>
     </a:lvl9pPr>
   </p:defaultTextStyle>
+  <p:extLst>
+    <p:ext uri="{EFAFB233-063F-42B5-8137-9DF3F51BA10A}">
+      <p15:sldGuideLst xmlns:p15="http://schemas.microsoft.com/office/powerpoint/2012/main"/>
+    </p:ext>
+  </p:extLst>
 </p:presentation>
+</file>
+
+<file path=ppt/changesInfos/changesInfo1.xml><?xml version="1.0" encoding="utf-8"?>
+<pc:chgInfo xmlns:a="http://schemas.openxmlformats.org/drawingml/2006/main" xmlns:r="http://schemas.openxmlformats.org/officeDocument/2006/relationships" xmlns:ac="http://schemas.microsoft.com/office/drawing/2013/main/command" xmlns:pc="http://schemas.microsoft.com/office/powerpoint/2013/main/command">
+  <pc:docChgLst>
+    <pc:chgData name="Nicky Wakim" userId="63a62853-8dd4-431b-8872-ecc2181a70d8" providerId="ADAL" clId="{D8D3057E-84ED-FB4F-A611-DCCD0937339D}"/>
+    <pc:docChg chg="undo custSel modSld">
+      <pc:chgData name="Nicky Wakim" userId="63a62853-8dd4-431b-8872-ecc2181a70d8" providerId="ADAL" clId="{D8D3057E-84ED-FB4F-A611-DCCD0937339D}" dt="2024-01-15T23:49:56.522" v="76" actId="14100"/>
+      <pc:docMkLst>
+        <pc:docMk/>
+      </pc:docMkLst>
+      <pc:sldChg chg="addSp delSp modSp mod">
+        <pc:chgData name="Nicky Wakim" userId="63a62853-8dd4-431b-8872-ecc2181a70d8" providerId="ADAL" clId="{D8D3057E-84ED-FB4F-A611-DCCD0937339D}" dt="2024-01-15T23:49:56.522" v="76" actId="14100"/>
+        <pc:sldMkLst>
+          <pc:docMk/>
+          <pc:sldMk cId="195836209" sldId="256"/>
+        </pc:sldMkLst>
+        <pc:spChg chg="mod">
+          <ac:chgData name="Nicky Wakim" userId="63a62853-8dd4-431b-8872-ecc2181a70d8" providerId="ADAL" clId="{D8D3057E-84ED-FB4F-A611-DCCD0937339D}" dt="2024-01-15T23:19:54.133" v="5" actId="20578"/>
+          <ac:spMkLst>
+            <pc:docMk/>
+            <pc:sldMk cId="195836209" sldId="256"/>
+            <ac:spMk id="7" creationId="{661EF34C-3443-779C-C112-C5A83984EDA3}"/>
+          </ac:spMkLst>
+        </pc:spChg>
+        <pc:spChg chg="add del mod">
+          <ac:chgData name="Nicky Wakim" userId="63a62853-8dd4-431b-8872-ecc2181a70d8" providerId="ADAL" clId="{D8D3057E-84ED-FB4F-A611-DCCD0937339D}" dt="2024-01-15T23:38:06.888" v="58" actId="478"/>
+          <ac:spMkLst>
+            <pc:docMk/>
+            <pc:sldMk cId="195836209" sldId="256"/>
+            <ac:spMk id="28" creationId="{7655A96D-F13E-4469-C893-FB70DE055E87}"/>
+          </ac:spMkLst>
+        </pc:spChg>
+        <pc:spChg chg="add del">
+          <ac:chgData name="Nicky Wakim" userId="63a62853-8dd4-431b-8872-ecc2181a70d8" providerId="ADAL" clId="{D8D3057E-84ED-FB4F-A611-DCCD0937339D}" dt="2024-01-15T23:38:33.855" v="60" actId="478"/>
+          <ac:spMkLst>
+            <pc:docMk/>
+            <pc:sldMk cId="195836209" sldId="256"/>
+            <ac:spMk id="29" creationId="{D90531B3-3B08-C5A4-A205-FA485CD189E9}"/>
+          </ac:spMkLst>
+        </pc:spChg>
+        <pc:spChg chg="add mod">
+          <ac:chgData name="Nicky Wakim" userId="63a62853-8dd4-431b-8872-ecc2181a70d8" providerId="ADAL" clId="{D8D3057E-84ED-FB4F-A611-DCCD0937339D}" dt="2024-01-15T23:49:56.522" v="76" actId="14100"/>
+          <ac:spMkLst>
+            <pc:docMk/>
+            <pc:sldMk cId="195836209" sldId="256"/>
+            <ac:spMk id="30" creationId="{C8D1687F-8EBA-B56F-6A73-D43241715D88}"/>
+          </ac:spMkLst>
+        </pc:spChg>
+        <pc:cxnChg chg="mod">
+          <ac:chgData name="Nicky Wakim" userId="63a62853-8dd4-431b-8872-ecc2181a70d8" providerId="ADAL" clId="{D8D3057E-84ED-FB4F-A611-DCCD0937339D}" dt="2024-01-15T23:39:40.432" v="69"/>
+          <ac:cxnSpMkLst>
+            <pc:docMk/>
+            <pc:sldMk cId="195836209" sldId="256"/>
+            <ac:cxnSpMk id="14" creationId="{C66F4CC9-BE1F-70D3-1CAE-D3D7AE4F1FDA}"/>
+          </ac:cxnSpMkLst>
+        </pc:cxnChg>
+        <pc:cxnChg chg="mod">
+          <ac:chgData name="Nicky Wakim" userId="63a62853-8dd4-431b-8872-ecc2181a70d8" providerId="ADAL" clId="{D8D3057E-84ED-FB4F-A611-DCCD0937339D}" dt="2024-01-15T23:36:43.241" v="42" actId="14100"/>
+          <ac:cxnSpMkLst>
+            <pc:docMk/>
+            <pc:sldMk cId="195836209" sldId="256"/>
+            <ac:cxnSpMk id="19" creationId="{E4571F4B-EB2B-3FAD-FD03-64612F0DFBC7}"/>
+          </ac:cxnSpMkLst>
+        </pc:cxnChg>
+        <pc:cxnChg chg="add del mod">
+          <ac:chgData name="Nicky Wakim" userId="63a62853-8dd4-431b-8872-ecc2181a70d8" providerId="ADAL" clId="{D8D3057E-84ED-FB4F-A611-DCCD0937339D}" dt="2024-01-15T23:36:11.140" v="21" actId="11529"/>
+          <ac:cxnSpMkLst>
+            <pc:docMk/>
+            <pc:sldMk cId="195836209" sldId="256"/>
+            <ac:cxnSpMk id="23" creationId="{F95B3F66-6851-F828-C953-DF6BBA75869B}"/>
+          </ac:cxnSpMkLst>
+        </pc:cxnChg>
+      </pc:sldChg>
+    </pc:docChg>
+  </pc:docChgLst>
+</pc:chgInfo>
 </file>
 
 <file path=ppt/slideLayouts/slideLayout1.xml><?xml version="1.0" encoding="utf-8"?>
@@ -254,7 +336,7 @@
           <a:p>
             <a:fld id="{0D1CA3F9-C225-4141-A414-327A9FBD7322}" type="datetimeFigureOut">
               <a:rPr lang="en-US" smtClean="0"/>
-              <a:t>1/6/24</a:t>
+              <a:t>1/15/24</a:t>
             </a:fld>
             <a:endParaRPr lang="en-US"/>
           </a:p>
@@ -452,7 +534,7 @@
           <a:p>
             <a:fld id="{0D1CA3F9-C225-4141-A414-327A9FBD7322}" type="datetimeFigureOut">
               <a:rPr lang="en-US" smtClean="0"/>
-              <a:t>1/6/24</a:t>
+              <a:t>1/15/24</a:t>
             </a:fld>
             <a:endParaRPr lang="en-US"/>
           </a:p>
@@ -660,7 +742,7 @@
           <a:p>
             <a:fld id="{0D1CA3F9-C225-4141-A414-327A9FBD7322}" type="datetimeFigureOut">
               <a:rPr lang="en-US" smtClean="0"/>
-              <a:t>1/6/24</a:t>
+              <a:t>1/15/24</a:t>
             </a:fld>
             <a:endParaRPr lang="en-US"/>
           </a:p>
@@ -858,7 +940,7 @@
           <a:p>
             <a:fld id="{0D1CA3F9-C225-4141-A414-327A9FBD7322}" type="datetimeFigureOut">
               <a:rPr lang="en-US" smtClean="0"/>
-              <a:t>1/6/24</a:t>
+              <a:t>1/15/24</a:t>
             </a:fld>
             <a:endParaRPr lang="en-US"/>
           </a:p>
@@ -1133,7 +1215,7 @@
           <a:p>
             <a:fld id="{0D1CA3F9-C225-4141-A414-327A9FBD7322}" type="datetimeFigureOut">
               <a:rPr lang="en-US" smtClean="0"/>
-              <a:t>1/6/24</a:t>
+              <a:t>1/15/24</a:t>
             </a:fld>
             <a:endParaRPr lang="en-US"/>
           </a:p>
@@ -1398,7 +1480,7 @@
           <a:p>
             <a:fld id="{0D1CA3F9-C225-4141-A414-327A9FBD7322}" type="datetimeFigureOut">
               <a:rPr lang="en-US" smtClean="0"/>
-              <a:t>1/6/24</a:t>
+              <a:t>1/15/24</a:t>
             </a:fld>
             <a:endParaRPr lang="en-US"/>
           </a:p>
@@ -1810,7 +1892,7 @@
           <a:p>
             <a:fld id="{0D1CA3F9-C225-4141-A414-327A9FBD7322}" type="datetimeFigureOut">
               <a:rPr lang="en-US" smtClean="0"/>
-              <a:t>1/6/24</a:t>
+              <a:t>1/15/24</a:t>
             </a:fld>
             <a:endParaRPr lang="en-US"/>
           </a:p>
@@ -1951,7 +2033,7 @@
           <a:p>
             <a:fld id="{0D1CA3F9-C225-4141-A414-327A9FBD7322}" type="datetimeFigureOut">
               <a:rPr lang="en-US" smtClean="0"/>
-              <a:t>1/6/24</a:t>
+              <a:t>1/15/24</a:t>
             </a:fld>
             <a:endParaRPr lang="en-US"/>
           </a:p>
@@ -2064,7 +2146,7 @@
           <a:p>
             <a:fld id="{0D1CA3F9-C225-4141-A414-327A9FBD7322}" type="datetimeFigureOut">
               <a:rPr lang="en-US" smtClean="0"/>
-              <a:t>1/6/24</a:t>
+              <a:t>1/15/24</a:t>
             </a:fld>
             <a:endParaRPr lang="en-US"/>
           </a:p>
@@ -2375,7 +2457,7 @@
           <a:p>
             <a:fld id="{0D1CA3F9-C225-4141-A414-327A9FBD7322}" type="datetimeFigureOut">
               <a:rPr lang="en-US" smtClean="0"/>
-              <a:t>1/6/24</a:t>
+              <a:t>1/15/24</a:t>
             </a:fld>
             <a:endParaRPr lang="en-US"/>
           </a:p>
@@ -2663,7 +2745,7 @@
           <a:p>
             <a:fld id="{0D1CA3F9-C225-4141-A414-327A9FBD7322}" type="datetimeFigureOut">
               <a:rPr lang="en-US" smtClean="0"/>
-              <a:t>1/6/24</a:t>
+              <a:t>1/15/24</a:t>
             </a:fld>
             <a:endParaRPr lang="en-US"/>
           </a:p>
@@ -2904,7 +2986,7 @@
           <a:p>
             <a:fld id="{0D1CA3F9-C225-4141-A414-327A9FBD7322}" type="datetimeFigureOut">
               <a:rPr lang="en-US" smtClean="0"/>
-              <a:t>1/6/24</a:t>
+              <a:t>1/15/24</a:t>
             </a:fld>
             <a:endParaRPr lang="en-US"/>
           </a:p>
@@ -3625,18 +3707,13 @@
               <a:buChar char="•"/>
             </a:pPr>
             <a:r>
-              <a:rPr lang="en-US" sz="2200">
+              <a:rPr lang="en-US" sz="2200" dirty="0">
                 <a:solidFill>
                   <a:schemeClr val="tx1"/>
                 </a:solidFill>
               </a:rPr>
               <a:t>Hypothesis tests for covariates</a:t>
             </a:r>
-            <a:endParaRPr lang="en-US" sz="2200" dirty="0">
-              <a:solidFill>
-                <a:schemeClr val="tx1"/>
-              </a:solidFill>
-            </a:endParaRPr>
           </a:p>
           <a:p>
             <a:pPr marL="236538" indent="-169863">
@@ -3905,7 +3982,8 @@
             <a:solidFill>
               <a:schemeClr val="tx1"/>
             </a:solidFill>
-            <a:tailEnd type="triangle"/>
+            <a:headEnd type="none" w="med" len="med"/>
+            <a:tailEnd type="arrow" w="med" len="med"/>
           </a:ln>
         </p:spPr>
         <p:style>
@@ -3979,19 +4057,17 @@
           </p:cNvPr>
           <p:cNvCxnSpPr>
             <a:cxnSpLocks/>
-            <a:stCxn id="11" idx="0"/>
-            <a:endCxn id="4" idx="0"/>
           </p:cNvCxnSpPr>
           <p:nvPr/>
         </p:nvCxnSpPr>
         <p:spPr>
           <a:xfrm rot="16200000" flipV="1">
-            <a:off x="5648305" y="-2757522"/>
+            <a:off x="5156292" y="2154272"/>
             <a:ext cx="12700" cy="7467600"/>
           </a:xfrm>
           <a:prstGeom prst="curvedConnector3">
             <a:avLst>
-              <a:gd name="adj1" fmla="val 2314283"/>
+              <a:gd name="adj1" fmla="val 7804283"/>
             </a:avLst>
           </a:prstGeom>
           <a:ln w="57150">
@@ -4016,6 +4092,118 @@
           </a:fontRef>
         </p:style>
       </p:cxnSp>
+      <p:sp>
+        <p:nvSpPr>
+          <p:cNvPr id="30" name="Freeform 29">
+            <a:extLst>
+              <a:ext uri="{FF2B5EF4-FFF2-40B4-BE49-F238E27FC236}">
+                <a16:creationId xmlns:a16="http://schemas.microsoft.com/office/drawing/2014/main" id="{C8D1687F-8EBA-B56F-6A73-D43241715D88}"/>
+              </a:ext>
+            </a:extLst>
+          </p:cNvPr>
+          <p:cNvSpPr/>
+          <p:nvPr/>
+        </p:nvSpPr>
+        <p:spPr>
+          <a:xfrm>
+            <a:off x="3451952" y="605789"/>
+            <a:ext cx="4381276" cy="378529"/>
+          </a:xfrm>
+          <a:custGeom>
+            <a:avLst/>
+            <a:gdLst>
+              <a:gd name="connsiteX0" fmla="*/ 4411980 w 4411980"/>
+              <a:gd name="connsiteY0" fmla="*/ 628704 h 628704"/>
+              <a:gd name="connsiteX1" fmla="*/ 3611880 w 4411980"/>
+              <a:gd name="connsiteY1" fmla="*/ 160074 h 628704"/>
+              <a:gd name="connsiteX2" fmla="*/ 2103120 w 4411980"/>
+              <a:gd name="connsiteY2" fmla="*/ 54 h 628704"/>
+              <a:gd name="connsiteX3" fmla="*/ 788670 w 4411980"/>
+              <a:gd name="connsiteY3" fmla="*/ 148644 h 628704"/>
+              <a:gd name="connsiteX4" fmla="*/ 0 w 4411980"/>
+              <a:gd name="connsiteY4" fmla="*/ 617274 h 628704"/>
+            </a:gdLst>
+            <a:ahLst/>
+            <a:cxnLst>
+              <a:cxn ang="0">
+                <a:pos x="connsiteX0" y="connsiteY0"/>
+              </a:cxn>
+              <a:cxn ang="0">
+                <a:pos x="connsiteX1" y="connsiteY1"/>
+              </a:cxn>
+              <a:cxn ang="0">
+                <a:pos x="connsiteX2" y="connsiteY2"/>
+              </a:cxn>
+              <a:cxn ang="0">
+                <a:pos x="connsiteX3" y="connsiteY3"/>
+              </a:cxn>
+              <a:cxn ang="0">
+                <a:pos x="connsiteX4" y="connsiteY4"/>
+              </a:cxn>
+            </a:cxnLst>
+            <a:rect l="l" t="t" r="r" b="b"/>
+            <a:pathLst>
+              <a:path w="4411980" h="628704">
+                <a:moveTo>
+                  <a:pt x="4411980" y="628704"/>
+                </a:moveTo>
+                <a:cubicBezTo>
+                  <a:pt x="4204335" y="446776"/>
+                  <a:pt x="3996690" y="264849"/>
+                  <a:pt x="3611880" y="160074"/>
+                </a:cubicBezTo>
+                <a:cubicBezTo>
+                  <a:pt x="3227070" y="55299"/>
+                  <a:pt x="2573655" y="1959"/>
+                  <a:pt x="2103120" y="54"/>
+                </a:cubicBezTo>
+                <a:cubicBezTo>
+                  <a:pt x="1632585" y="-1851"/>
+                  <a:pt x="1139190" y="45774"/>
+                  <a:pt x="788670" y="148644"/>
+                </a:cubicBezTo>
+                <a:cubicBezTo>
+                  <a:pt x="438150" y="251514"/>
+                  <a:pt x="180975" y="485829"/>
+                  <a:pt x="0" y="617274"/>
+                </a:cubicBezTo>
+              </a:path>
+            </a:pathLst>
+          </a:custGeom>
+          <a:noFill/>
+          <a:ln w="57150">
+            <a:solidFill>
+              <a:schemeClr val="tx1"/>
+            </a:solidFill>
+            <a:headEnd type="none" w="med" len="med"/>
+            <a:tailEnd type="arrow" w="med" len="med"/>
+          </a:ln>
+        </p:spPr>
+        <p:style>
+          <a:lnRef idx="2">
+            <a:schemeClr val="accent1">
+              <a:shade val="15000"/>
+            </a:schemeClr>
+          </a:lnRef>
+          <a:fillRef idx="1">
+            <a:schemeClr val="accent1"/>
+          </a:fillRef>
+          <a:effectRef idx="0">
+            <a:schemeClr val="accent1"/>
+          </a:effectRef>
+          <a:fontRef idx="minor">
+            <a:schemeClr val="lt1"/>
+          </a:fontRef>
+        </p:style>
+        <p:txBody>
+          <a:bodyPr rtlCol="0" anchor="ctr"/>
+          <a:lstStyle/>
+          <a:p>
+            <a:pPr algn="ctr"/>
+            <a:endParaRPr lang="en-US"/>
+          </a:p>
+        </p:txBody>
+      </p:sp>
     </p:spTree>
     <p:extLst>
       <p:ext uri="{BB962C8B-B14F-4D97-AF65-F5344CB8AC3E}">

</xml_diff>

<commit_message>
SLR day 2, week 3, more on HW1
</commit_message>
<xml_diff>
--- a/images/Regression_analysis_process.pptx
+++ b/images/Regression_analysis_process.pptx
@@ -117,16 +117,40 @@
   <pc:docChgLst>
     <pc:chgData name="Nicky Wakim" userId="63a62853-8dd4-431b-8872-ecc2181a70d8" providerId="ADAL" clId="{D8D3057E-84ED-FB4F-A611-DCCD0937339D}"/>
     <pc:docChg chg="undo custSel modSld">
-      <pc:chgData name="Nicky Wakim" userId="63a62853-8dd4-431b-8872-ecc2181a70d8" providerId="ADAL" clId="{D8D3057E-84ED-FB4F-A611-DCCD0937339D}" dt="2024-01-15T23:49:56.522" v="76" actId="14100"/>
+      <pc:chgData name="Nicky Wakim" userId="63a62853-8dd4-431b-8872-ecc2181a70d8" providerId="ADAL" clId="{D8D3057E-84ED-FB4F-A611-DCCD0937339D}" dt="2024-01-19T23:51:12.707" v="132" actId="14100"/>
       <pc:docMkLst>
         <pc:docMk/>
       </pc:docMkLst>
       <pc:sldChg chg="addSp delSp modSp mod">
-        <pc:chgData name="Nicky Wakim" userId="63a62853-8dd4-431b-8872-ecc2181a70d8" providerId="ADAL" clId="{D8D3057E-84ED-FB4F-A611-DCCD0937339D}" dt="2024-01-15T23:49:56.522" v="76" actId="14100"/>
+        <pc:chgData name="Nicky Wakim" userId="63a62853-8dd4-431b-8872-ecc2181a70d8" providerId="ADAL" clId="{D8D3057E-84ED-FB4F-A611-DCCD0937339D}" dt="2024-01-19T23:51:12.707" v="132" actId="14100"/>
         <pc:sldMkLst>
           <pc:docMk/>
           <pc:sldMk cId="195836209" sldId="256"/>
         </pc:sldMkLst>
+        <pc:spChg chg="add del mod">
+          <ac:chgData name="Nicky Wakim" userId="63a62853-8dd4-431b-8872-ecc2181a70d8" providerId="ADAL" clId="{D8D3057E-84ED-FB4F-A611-DCCD0937339D}" dt="2024-01-19T23:34:18.365" v="82" actId="478"/>
+          <ac:spMkLst>
+            <pc:docMk/>
+            <pc:sldMk cId="195836209" sldId="256"/>
+            <ac:spMk id="2" creationId="{36DC8041-5B4F-5A50-2C8D-8ECDF401B56D}"/>
+          </ac:spMkLst>
+        </pc:spChg>
+        <pc:spChg chg="add mod">
+          <ac:chgData name="Nicky Wakim" userId="63a62853-8dd4-431b-8872-ecc2181a70d8" providerId="ADAL" clId="{D8D3057E-84ED-FB4F-A611-DCCD0937339D}" dt="2024-01-19T23:50:48.448" v="126" actId="207"/>
+          <ac:spMkLst>
+            <pc:docMk/>
+            <pc:sldMk cId="195836209" sldId="256"/>
+            <ac:spMk id="3" creationId="{03F066C6-588F-A5FF-5C38-49ABFD5B7D31}"/>
+          </ac:spMkLst>
+        </pc:spChg>
+        <pc:spChg chg="mod">
+          <ac:chgData name="Nicky Wakim" userId="63a62853-8dd4-431b-8872-ecc2181a70d8" providerId="ADAL" clId="{D8D3057E-84ED-FB4F-A611-DCCD0937339D}" dt="2024-01-19T23:50:58.523" v="128" actId="1076"/>
+          <ac:spMkLst>
+            <pc:docMk/>
+            <pc:sldMk cId="195836209" sldId="256"/>
+            <ac:spMk id="4" creationId="{2373BE04-FED8-345C-0B68-6A89C7543EC6}"/>
+          </ac:spMkLst>
+        </pc:spChg>
         <pc:spChg chg="mod">
           <ac:chgData name="Nicky Wakim" userId="63a62853-8dd4-431b-8872-ecc2181a70d8" providerId="ADAL" clId="{D8D3057E-84ED-FB4F-A611-DCCD0937339D}" dt="2024-01-15T23:19:54.133" v="5" actId="20578"/>
           <ac:spMkLst>
@@ -160,11 +184,19 @@
           </ac:spMkLst>
         </pc:spChg>
         <pc:cxnChg chg="mod">
-          <ac:chgData name="Nicky Wakim" userId="63a62853-8dd4-431b-8872-ecc2181a70d8" providerId="ADAL" clId="{D8D3057E-84ED-FB4F-A611-DCCD0937339D}" dt="2024-01-15T23:39:40.432" v="69"/>
+          <ac:chgData name="Nicky Wakim" userId="63a62853-8dd4-431b-8872-ecc2181a70d8" providerId="ADAL" clId="{D8D3057E-84ED-FB4F-A611-DCCD0937339D}" dt="2024-01-19T23:50:58.523" v="128" actId="1076"/>
           <ac:cxnSpMkLst>
             <pc:docMk/>
             <pc:sldMk cId="195836209" sldId="256"/>
             <ac:cxnSpMk id="14" creationId="{C66F4CC9-BE1F-70D3-1CAE-D3D7AE4F1FDA}"/>
+          </ac:cxnSpMkLst>
+        </pc:cxnChg>
+        <pc:cxnChg chg="add mod">
+          <ac:chgData name="Nicky Wakim" userId="63a62853-8dd4-431b-8872-ecc2181a70d8" providerId="ADAL" clId="{D8D3057E-84ED-FB4F-A611-DCCD0937339D}" dt="2024-01-19T23:51:12.707" v="132" actId="14100"/>
+          <ac:cxnSpMkLst>
+            <pc:docMk/>
+            <pc:sldMk cId="195836209" sldId="256"/>
+            <ac:cxnSpMk id="17" creationId="{4A5153A1-8014-5E7C-D79F-AAA8F8935C67}"/>
           </ac:cxnSpMkLst>
         </pc:cxnChg>
         <pc:cxnChg chg="mod">
@@ -336,7 +368,7 @@
           <a:p>
             <a:fld id="{0D1CA3F9-C225-4141-A414-327A9FBD7322}" type="datetimeFigureOut">
               <a:rPr lang="en-US" smtClean="0"/>
-              <a:t>1/15/24</a:t>
+              <a:t>1/19/24</a:t>
             </a:fld>
             <a:endParaRPr lang="en-US"/>
           </a:p>
@@ -534,7 +566,7 @@
           <a:p>
             <a:fld id="{0D1CA3F9-C225-4141-A414-327A9FBD7322}" type="datetimeFigureOut">
               <a:rPr lang="en-US" smtClean="0"/>
-              <a:t>1/15/24</a:t>
+              <a:t>1/19/24</a:t>
             </a:fld>
             <a:endParaRPr lang="en-US"/>
           </a:p>
@@ -742,7 +774,7 @@
           <a:p>
             <a:fld id="{0D1CA3F9-C225-4141-A414-327A9FBD7322}" type="datetimeFigureOut">
               <a:rPr lang="en-US" smtClean="0"/>
-              <a:t>1/15/24</a:t>
+              <a:t>1/19/24</a:t>
             </a:fld>
             <a:endParaRPr lang="en-US"/>
           </a:p>
@@ -940,7 +972,7 @@
           <a:p>
             <a:fld id="{0D1CA3F9-C225-4141-A414-327A9FBD7322}" type="datetimeFigureOut">
               <a:rPr lang="en-US" smtClean="0"/>
-              <a:t>1/15/24</a:t>
+              <a:t>1/19/24</a:t>
             </a:fld>
             <a:endParaRPr lang="en-US"/>
           </a:p>
@@ -1215,7 +1247,7 @@
           <a:p>
             <a:fld id="{0D1CA3F9-C225-4141-A414-327A9FBD7322}" type="datetimeFigureOut">
               <a:rPr lang="en-US" smtClean="0"/>
-              <a:t>1/15/24</a:t>
+              <a:t>1/19/24</a:t>
             </a:fld>
             <a:endParaRPr lang="en-US"/>
           </a:p>
@@ -1480,7 +1512,7 @@
           <a:p>
             <a:fld id="{0D1CA3F9-C225-4141-A414-327A9FBD7322}" type="datetimeFigureOut">
               <a:rPr lang="en-US" smtClean="0"/>
-              <a:t>1/15/24</a:t>
+              <a:t>1/19/24</a:t>
             </a:fld>
             <a:endParaRPr lang="en-US"/>
           </a:p>
@@ -1892,7 +1924,7 @@
           <a:p>
             <a:fld id="{0D1CA3F9-C225-4141-A414-327A9FBD7322}" type="datetimeFigureOut">
               <a:rPr lang="en-US" smtClean="0"/>
-              <a:t>1/15/24</a:t>
+              <a:t>1/19/24</a:t>
             </a:fld>
             <a:endParaRPr lang="en-US"/>
           </a:p>
@@ -2033,7 +2065,7 @@
           <a:p>
             <a:fld id="{0D1CA3F9-C225-4141-A414-327A9FBD7322}" type="datetimeFigureOut">
               <a:rPr lang="en-US" smtClean="0"/>
-              <a:t>1/15/24</a:t>
+              <a:t>1/19/24</a:t>
             </a:fld>
             <a:endParaRPr lang="en-US"/>
           </a:p>
@@ -2146,7 +2178,7 @@
           <a:p>
             <a:fld id="{0D1CA3F9-C225-4141-A414-327A9FBD7322}" type="datetimeFigureOut">
               <a:rPr lang="en-US" smtClean="0"/>
-              <a:t>1/15/24</a:t>
+              <a:t>1/19/24</a:t>
             </a:fld>
             <a:endParaRPr lang="en-US"/>
           </a:p>
@@ -2457,7 +2489,7 @@
           <a:p>
             <a:fld id="{0D1CA3F9-C225-4141-A414-327A9FBD7322}" type="datetimeFigureOut">
               <a:rPr lang="en-US" smtClean="0"/>
-              <a:t>1/15/24</a:t>
+              <a:t>1/19/24</a:t>
             </a:fld>
             <a:endParaRPr lang="en-US"/>
           </a:p>
@@ -2745,7 +2777,7 @@
           <a:p>
             <a:fld id="{0D1CA3F9-C225-4141-A414-327A9FBD7322}" type="datetimeFigureOut">
               <a:rPr lang="en-US" smtClean="0"/>
-              <a:t>1/15/24</a:t>
+              <a:t>1/19/24</a:t>
             </a:fld>
             <a:endParaRPr lang="en-US"/>
           </a:p>
@@ -2986,7 +3018,7 @@
           <a:p>
             <a:fld id="{0D1CA3F9-C225-4141-A414-327A9FBD7322}" type="datetimeFigureOut">
               <a:rPr lang="en-US" smtClean="0"/>
-              <a:t>1/15/24</a:t>
+              <a:t>1/19/24</a:t>
             </a:fld>
             <a:endParaRPr lang="en-US"/>
           </a:p>
@@ -3417,7 +3449,7 @@
         </p:nvSpPr>
         <p:spPr>
           <a:xfrm>
-            <a:off x="365628" y="976278"/>
+            <a:off x="354198" y="986235"/>
             <a:ext cx="3097754" cy="466753"/>
           </a:xfrm>
           <a:prstGeom prst="roundRect">
@@ -3965,15 +3997,16 @@
             </a:extLst>
           </p:cNvPr>
           <p:cNvCxnSpPr>
+            <a:cxnSpLocks/>
             <a:stCxn id="4" idx="3"/>
             <a:endCxn id="9" idx="1"/>
           </p:cNvCxnSpPr>
           <p:nvPr/>
         </p:nvCxnSpPr>
         <p:spPr>
-          <a:xfrm>
-            <a:off x="3463382" y="1209655"/>
-            <a:ext cx="636046" cy="0"/>
+          <a:xfrm flipV="1">
+            <a:off x="3451952" y="1209655"/>
+            <a:ext cx="647476" cy="9957"/>
           </a:xfrm>
           <a:prstGeom prst="straightConnector1">
             <a:avLst/>
@@ -4204,6 +4237,145 @@
           </a:p>
         </p:txBody>
       </p:sp>
+      <p:sp>
+        <p:nvSpPr>
+          <p:cNvPr id="3" name="Rectangle 2">
+            <a:extLst>
+              <a:ext uri="{FF2B5EF4-FFF2-40B4-BE49-F238E27FC236}">
+                <a16:creationId xmlns:a16="http://schemas.microsoft.com/office/drawing/2014/main" id="{03F066C6-588F-A5FF-5C38-49ABFD5B7D31}"/>
+              </a:ext>
+            </a:extLst>
+          </p:cNvPr>
+          <p:cNvSpPr/>
+          <p:nvPr/>
+        </p:nvSpPr>
+        <p:spPr>
+          <a:xfrm>
+            <a:off x="4358773" y="5458459"/>
+            <a:ext cx="3097754" cy="1146447"/>
+          </a:xfrm>
+          <a:prstGeom prst="rect">
+            <a:avLst/>
+          </a:prstGeom>
+          <a:solidFill>
+            <a:srgbClr val="4FAEF3">
+              <a:alpha val="36471"/>
+            </a:srgbClr>
+          </a:solidFill>
+          <a:ln w="57150">
+            <a:solidFill>
+              <a:srgbClr val="4FAEF3"/>
+            </a:solidFill>
+          </a:ln>
+        </p:spPr>
+        <p:style>
+          <a:lnRef idx="2">
+            <a:schemeClr val="accent1">
+              <a:shade val="50000"/>
+            </a:schemeClr>
+          </a:lnRef>
+          <a:fillRef idx="1">
+            <a:schemeClr val="accent1"/>
+          </a:fillRef>
+          <a:effectRef idx="0">
+            <a:schemeClr val="accent1"/>
+          </a:effectRef>
+          <a:fontRef idx="minor">
+            <a:schemeClr val="lt1"/>
+          </a:fontRef>
+        </p:style>
+        <p:txBody>
+          <a:bodyPr rtlCol="0" anchor="t"/>
+          <a:lstStyle/>
+          <a:p>
+            <a:pPr marL="236538" indent="-169863">
+              <a:buFont typeface="Arial" panose="020B0604020202020204" pitchFamily="34" charset="0"/>
+              <a:buChar char="•"/>
+            </a:pPr>
+            <a:r>
+              <a:rPr lang="en-US" sz="2200" dirty="0">
+                <a:solidFill>
+                  <a:schemeClr val="tx1"/>
+                </a:solidFill>
+              </a:rPr>
+              <a:t>Building a model</a:t>
+            </a:r>
+          </a:p>
+          <a:p>
+            <a:pPr marL="236538" indent="-169863">
+              <a:buFont typeface="Arial" panose="020B0604020202020204" pitchFamily="34" charset="0"/>
+              <a:buChar char="•"/>
+            </a:pPr>
+            <a:r>
+              <a:rPr lang="en-US" sz="2200" dirty="0">
+                <a:solidFill>
+                  <a:schemeClr val="tx1"/>
+                </a:solidFill>
+              </a:rPr>
+              <a:t>Prediction vs interpretation</a:t>
+            </a:r>
+          </a:p>
+          <a:p>
+            <a:pPr marL="236538" indent="-169863">
+              <a:buFont typeface="Arial" panose="020B0604020202020204" pitchFamily="34" charset="0"/>
+              <a:buChar char="•"/>
+            </a:pPr>
+            <a:r>
+              <a:rPr lang="en-US" sz="2200" dirty="0">
+                <a:solidFill>
+                  <a:schemeClr val="tx1"/>
+                </a:solidFill>
+              </a:rPr>
+              <a:t>Comparing models</a:t>
+            </a:r>
+          </a:p>
+        </p:txBody>
+      </p:sp>
+      <p:cxnSp>
+        <p:nvCxnSpPr>
+          <p:cNvPr id="17" name="Straight Arrow Connector 16">
+            <a:extLst>
+              <a:ext uri="{FF2B5EF4-FFF2-40B4-BE49-F238E27FC236}">
+                <a16:creationId xmlns:a16="http://schemas.microsoft.com/office/drawing/2014/main" id="{4A5153A1-8014-5E7C-D79F-AAA8F8935C67}"/>
+              </a:ext>
+            </a:extLst>
+          </p:cNvPr>
+          <p:cNvCxnSpPr>
+            <a:cxnSpLocks/>
+          </p:cNvCxnSpPr>
+          <p:nvPr/>
+        </p:nvCxnSpPr>
+        <p:spPr>
+          <a:xfrm>
+            <a:off x="799968" y="5017770"/>
+            <a:ext cx="0" cy="440689"/>
+          </a:xfrm>
+          <a:prstGeom prst="straightConnector1">
+            <a:avLst/>
+          </a:prstGeom>
+          <a:ln w="57150">
+            <a:solidFill>
+              <a:schemeClr val="tx1"/>
+            </a:solidFill>
+            <a:headEnd type="none" w="med" len="med"/>
+            <a:tailEnd type="arrow" w="med" len="med"/>
+          </a:ln>
+        </p:spPr>
+        <p:style>
+          <a:lnRef idx="1">
+            <a:schemeClr val="accent1"/>
+          </a:lnRef>
+          <a:fillRef idx="0">
+            <a:schemeClr val="accent1"/>
+          </a:fillRef>
+          <a:effectRef idx="0">
+            <a:schemeClr val="accent1"/>
+          </a:effectRef>
+          <a:fontRef idx="minor">
+            <a:schemeClr val="tx1"/>
+          </a:fontRef>
+        </p:style>
+      </p:cxnSp>
     </p:spTree>
     <p:extLst>
       <p:ext uri="{BB962C8B-B14F-4D97-AF65-F5344CB8AC3E}">

</xml_diff>

<commit_message>
Updated weeks and homework 2
</commit_message>
<xml_diff>
--- a/images/Regression_analysis_process.pptx
+++ b/images/Regression_analysis_process.pptx
@@ -117,16 +117,24 @@
   <pc:docChgLst>
     <pc:chgData name="Nicky Wakim" userId="63a62853-8dd4-431b-8872-ecc2181a70d8" providerId="ADAL" clId="{D8D3057E-84ED-FB4F-A611-DCCD0937339D}"/>
     <pc:docChg chg="undo custSel modSld">
-      <pc:chgData name="Nicky Wakim" userId="63a62853-8dd4-431b-8872-ecc2181a70d8" providerId="ADAL" clId="{D8D3057E-84ED-FB4F-A611-DCCD0937339D}" dt="2024-01-19T23:51:12.707" v="132" actId="14100"/>
+      <pc:chgData name="Nicky Wakim" userId="63a62853-8dd4-431b-8872-ecc2181a70d8" providerId="ADAL" clId="{D8D3057E-84ED-FB4F-A611-DCCD0937339D}" dt="2024-01-21T20:47:42.674" v="142" actId="207"/>
       <pc:docMkLst>
         <pc:docMk/>
       </pc:docMkLst>
       <pc:sldChg chg="addSp delSp modSp mod">
-        <pc:chgData name="Nicky Wakim" userId="63a62853-8dd4-431b-8872-ecc2181a70d8" providerId="ADAL" clId="{D8D3057E-84ED-FB4F-A611-DCCD0937339D}" dt="2024-01-19T23:51:12.707" v="132" actId="14100"/>
+        <pc:chgData name="Nicky Wakim" userId="63a62853-8dd4-431b-8872-ecc2181a70d8" providerId="ADAL" clId="{D8D3057E-84ED-FB4F-A611-DCCD0937339D}" dt="2024-01-21T20:47:42.674" v="142" actId="207"/>
         <pc:sldMkLst>
           <pc:docMk/>
           <pc:sldMk cId="195836209" sldId="256"/>
         </pc:sldMkLst>
+        <pc:spChg chg="add mod">
+          <ac:chgData name="Nicky Wakim" userId="63a62853-8dd4-431b-8872-ecc2181a70d8" providerId="ADAL" clId="{D8D3057E-84ED-FB4F-A611-DCCD0937339D}" dt="2024-01-21T20:47:42.674" v="142" actId="207"/>
+          <ac:spMkLst>
+            <pc:docMk/>
+            <pc:sldMk cId="195836209" sldId="256"/>
+            <ac:spMk id="2" creationId="{12985CD7-D1C1-A836-013F-6500750E758A}"/>
+          </ac:spMkLst>
+        </pc:spChg>
         <pc:spChg chg="add del mod">
           <ac:chgData name="Nicky Wakim" userId="63a62853-8dd4-431b-8872-ecc2181a70d8" providerId="ADAL" clId="{D8D3057E-84ED-FB4F-A611-DCCD0937339D}" dt="2024-01-19T23:34:18.365" v="82" actId="478"/>
           <ac:spMkLst>
@@ -368,7 +376,7 @@
           <a:p>
             <a:fld id="{0D1CA3F9-C225-4141-A414-327A9FBD7322}" type="datetimeFigureOut">
               <a:rPr lang="en-US" smtClean="0"/>
-              <a:t>1/19/24</a:t>
+              <a:t>1/21/24</a:t>
             </a:fld>
             <a:endParaRPr lang="en-US"/>
           </a:p>
@@ -566,7 +574,7 @@
           <a:p>
             <a:fld id="{0D1CA3F9-C225-4141-A414-327A9FBD7322}" type="datetimeFigureOut">
               <a:rPr lang="en-US" smtClean="0"/>
-              <a:t>1/19/24</a:t>
+              <a:t>1/21/24</a:t>
             </a:fld>
             <a:endParaRPr lang="en-US"/>
           </a:p>
@@ -774,7 +782,7 @@
           <a:p>
             <a:fld id="{0D1CA3F9-C225-4141-A414-327A9FBD7322}" type="datetimeFigureOut">
               <a:rPr lang="en-US" smtClean="0"/>
-              <a:t>1/19/24</a:t>
+              <a:t>1/21/24</a:t>
             </a:fld>
             <a:endParaRPr lang="en-US"/>
           </a:p>
@@ -972,7 +980,7 @@
           <a:p>
             <a:fld id="{0D1CA3F9-C225-4141-A414-327A9FBD7322}" type="datetimeFigureOut">
               <a:rPr lang="en-US" smtClean="0"/>
-              <a:t>1/19/24</a:t>
+              <a:t>1/21/24</a:t>
             </a:fld>
             <a:endParaRPr lang="en-US"/>
           </a:p>
@@ -1247,7 +1255,7 @@
           <a:p>
             <a:fld id="{0D1CA3F9-C225-4141-A414-327A9FBD7322}" type="datetimeFigureOut">
               <a:rPr lang="en-US" smtClean="0"/>
-              <a:t>1/19/24</a:t>
+              <a:t>1/21/24</a:t>
             </a:fld>
             <a:endParaRPr lang="en-US"/>
           </a:p>
@@ -1512,7 +1520,7 @@
           <a:p>
             <a:fld id="{0D1CA3F9-C225-4141-A414-327A9FBD7322}" type="datetimeFigureOut">
               <a:rPr lang="en-US" smtClean="0"/>
-              <a:t>1/19/24</a:t>
+              <a:t>1/21/24</a:t>
             </a:fld>
             <a:endParaRPr lang="en-US"/>
           </a:p>
@@ -1924,7 +1932,7 @@
           <a:p>
             <a:fld id="{0D1CA3F9-C225-4141-A414-327A9FBD7322}" type="datetimeFigureOut">
               <a:rPr lang="en-US" smtClean="0"/>
-              <a:t>1/19/24</a:t>
+              <a:t>1/21/24</a:t>
             </a:fld>
             <a:endParaRPr lang="en-US"/>
           </a:p>
@@ -2065,7 +2073,7 @@
           <a:p>
             <a:fld id="{0D1CA3F9-C225-4141-A414-327A9FBD7322}" type="datetimeFigureOut">
               <a:rPr lang="en-US" smtClean="0"/>
-              <a:t>1/19/24</a:t>
+              <a:t>1/21/24</a:t>
             </a:fld>
             <a:endParaRPr lang="en-US"/>
           </a:p>
@@ -2178,7 +2186,7 @@
           <a:p>
             <a:fld id="{0D1CA3F9-C225-4141-A414-327A9FBD7322}" type="datetimeFigureOut">
               <a:rPr lang="en-US" smtClean="0"/>
-              <a:t>1/19/24</a:t>
+              <a:t>1/21/24</a:t>
             </a:fld>
             <a:endParaRPr lang="en-US"/>
           </a:p>
@@ -2489,7 +2497,7 @@
           <a:p>
             <a:fld id="{0D1CA3F9-C225-4141-A414-327A9FBD7322}" type="datetimeFigureOut">
               <a:rPr lang="en-US" smtClean="0"/>
-              <a:t>1/19/24</a:t>
+              <a:t>1/21/24</a:t>
             </a:fld>
             <a:endParaRPr lang="en-US"/>
           </a:p>
@@ -2777,7 +2785,7 @@
           <a:p>
             <a:fld id="{0D1CA3F9-C225-4141-A414-327A9FBD7322}" type="datetimeFigureOut">
               <a:rPr lang="en-US" smtClean="0"/>
-              <a:t>1/19/24</a:t>
+              <a:t>1/21/24</a:t>
             </a:fld>
             <a:endParaRPr lang="en-US"/>
           </a:p>
@@ -3018,7 +3026,7 @@
           <a:p>
             <a:fld id="{0D1CA3F9-C225-4141-A414-327A9FBD7322}" type="datetimeFigureOut">
               <a:rPr lang="en-US" smtClean="0"/>
-              <a:t>1/19/24</a:t>
+              <a:t>1/21/24</a:t>
             </a:fld>
             <a:endParaRPr lang="en-US"/>
           </a:p>
@@ -4376,6 +4384,100 @@
           </a:fontRef>
         </p:style>
       </p:cxnSp>
+      <p:sp>
+        <p:nvSpPr>
+          <p:cNvPr id="2" name="Rectangle 1">
+            <a:extLst>
+              <a:ext uri="{FF2B5EF4-FFF2-40B4-BE49-F238E27FC236}">
+                <a16:creationId xmlns:a16="http://schemas.microsoft.com/office/drawing/2014/main" id="{12985CD7-D1C1-A836-013F-6500750E758A}"/>
+              </a:ext>
+            </a:extLst>
+          </p:cNvPr>
+          <p:cNvSpPr/>
+          <p:nvPr/>
+        </p:nvSpPr>
+        <p:spPr>
+          <a:xfrm>
+            <a:off x="677936" y="5266937"/>
+            <a:ext cx="3097754" cy="1209655"/>
+          </a:xfrm>
+          <a:prstGeom prst="rect">
+            <a:avLst/>
+          </a:prstGeom>
+          <a:solidFill>
+            <a:srgbClr val="FF8021">
+              <a:alpha val="81569"/>
+            </a:srgbClr>
+          </a:solidFill>
+          <a:ln w="57150">
+            <a:solidFill>
+              <a:srgbClr val="FF8021"/>
+            </a:solidFill>
+          </a:ln>
+        </p:spPr>
+        <p:style>
+          <a:lnRef idx="2">
+            <a:schemeClr val="accent1">
+              <a:shade val="50000"/>
+            </a:schemeClr>
+          </a:lnRef>
+          <a:fillRef idx="1">
+            <a:schemeClr val="accent1"/>
+          </a:fillRef>
+          <a:effectRef idx="0">
+            <a:schemeClr val="accent1"/>
+          </a:effectRef>
+          <a:fontRef idx="minor">
+            <a:schemeClr val="lt1"/>
+          </a:fontRef>
+        </p:style>
+        <p:txBody>
+          <a:bodyPr rtlCol="0" anchor="t"/>
+          <a:lstStyle/>
+          <a:p>
+            <a:pPr marL="236538" indent="-169863">
+              <a:buFont typeface="Arial" panose="020B0604020202020204" pitchFamily="34" charset="0"/>
+              <a:buChar char="•"/>
+            </a:pPr>
+            <a:r>
+              <a:rPr lang="en-US" sz="2200" dirty="0">
+                <a:solidFill>
+                  <a:schemeClr val="tx1"/>
+                </a:solidFill>
+              </a:rPr>
+              <a:t>Building a model</a:t>
+            </a:r>
+          </a:p>
+          <a:p>
+            <a:pPr marL="236538" indent="-169863">
+              <a:buFont typeface="Arial" panose="020B0604020202020204" pitchFamily="34" charset="0"/>
+              <a:buChar char="•"/>
+            </a:pPr>
+            <a:r>
+              <a:rPr lang="en-US" sz="2200" dirty="0">
+                <a:solidFill>
+                  <a:schemeClr val="tx1"/>
+                </a:solidFill>
+              </a:rPr>
+              <a:t>Prediction vs interpretation</a:t>
+            </a:r>
+          </a:p>
+          <a:p>
+            <a:pPr marL="236538" indent="-169863">
+              <a:buFont typeface="Arial" panose="020B0604020202020204" pitchFamily="34" charset="0"/>
+              <a:buChar char="•"/>
+            </a:pPr>
+            <a:r>
+              <a:rPr lang="en-US" sz="2200" dirty="0">
+                <a:solidFill>
+                  <a:schemeClr val="tx1"/>
+                </a:solidFill>
+              </a:rPr>
+              <a:t>Comparing models</a:t>
+            </a:r>
+          </a:p>
+        </p:txBody>
+      </p:sp>
     </p:spTree>
     <p:extLst>
       <p:ext uri="{BB962C8B-B14F-4D97-AF65-F5344CB8AC3E}">

</xml_diff>

<commit_message>
Post class interactions 1
</commit_message>
<xml_diff>
--- a/images/Regression_analysis_process.pptx
+++ b/images/Regression_analysis_process.pptx
@@ -117,12 +117,12 @@
   <pc:docChgLst>
     <pc:chgData name="Nicky Wakim" userId="63a62853-8dd4-431b-8872-ecc2181a70d8" providerId="ADAL" clId="{D8D3057E-84ED-FB4F-A611-DCCD0937339D}"/>
     <pc:docChg chg="undo custSel modSld">
-      <pc:chgData name="Nicky Wakim" userId="63a62853-8dd4-431b-8872-ecc2181a70d8" providerId="ADAL" clId="{D8D3057E-84ED-FB4F-A611-DCCD0937339D}" dt="2024-01-21T20:47:42.674" v="142" actId="207"/>
+      <pc:chgData name="Nicky Wakim" userId="63a62853-8dd4-431b-8872-ecc2181a70d8" providerId="ADAL" clId="{D8D3057E-84ED-FB4F-A611-DCCD0937339D}" dt="2024-02-14T23:54:15.243" v="146" actId="1037"/>
       <pc:docMkLst>
         <pc:docMk/>
       </pc:docMkLst>
       <pc:sldChg chg="addSp delSp modSp mod">
-        <pc:chgData name="Nicky Wakim" userId="63a62853-8dd4-431b-8872-ecc2181a70d8" providerId="ADAL" clId="{D8D3057E-84ED-FB4F-A611-DCCD0937339D}" dt="2024-01-21T20:47:42.674" v="142" actId="207"/>
+        <pc:chgData name="Nicky Wakim" userId="63a62853-8dd4-431b-8872-ecc2181a70d8" providerId="ADAL" clId="{D8D3057E-84ED-FB4F-A611-DCCD0937339D}" dt="2024-02-14T23:54:15.243" v="146" actId="1037"/>
         <pc:sldMkLst>
           <pc:docMk/>
           <pc:sldMk cId="195836209" sldId="256"/>
@@ -159,12 +159,36 @@
             <ac:spMk id="4" creationId="{2373BE04-FED8-345C-0B68-6A89C7543EC6}"/>
           </ac:spMkLst>
         </pc:spChg>
+        <pc:spChg chg="add mod">
+          <ac:chgData name="Nicky Wakim" userId="63a62853-8dd4-431b-8872-ecc2181a70d8" providerId="ADAL" clId="{D8D3057E-84ED-FB4F-A611-DCCD0937339D}" dt="2024-02-13T01:23:48.772" v="143"/>
+          <ac:spMkLst>
+            <pc:docMk/>
+            <pc:sldMk cId="195836209" sldId="256"/>
+            <ac:spMk id="5" creationId="{EA368D9C-2B9E-AE0A-1FA3-6898223F7DE0}"/>
+          </ac:spMkLst>
+        </pc:spChg>
+        <pc:spChg chg="add mod">
+          <ac:chgData name="Nicky Wakim" userId="63a62853-8dd4-431b-8872-ecc2181a70d8" providerId="ADAL" clId="{D8D3057E-84ED-FB4F-A611-DCCD0937339D}" dt="2024-02-13T01:24:14.074" v="144"/>
+          <ac:spMkLst>
+            <pc:docMk/>
+            <pc:sldMk cId="195836209" sldId="256"/>
+            <ac:spMk id="6" creationId="{20B82AA9-D2FD-421E-D489-3956EB8E7AD8}"/>
+          </ac:spMkLst>
+        </pc:spChg>
         <pc:spChg chg="mod">
           <ac:chgData name="Nicky Wakim" userId="63a62853-8dd4-431b-8872-ecc2181a70d8" providerId="ADAL" clId="{D8D3057E-84ED-FB4F-A611-DCCD0937339D}" dt="2024-01-15T23:19:54.133" v="5" actId="20578"/>
           <ac:spMkLst>
             <pc:docMk/>
             <pc:sldMk cId="195836209" sldId="256"/>
             <ac:spMk id="7" creationId="{661EF34C-3443-779C-C112-C5A83984EDA3}"/>
+          </ac:spMkLst>
+        </pc:spChg>
+        <pc:spChg chg="add mod">
+          <ac:chgData name="Nicky Wakim" userId="63a62853-8dd4-431b-8872-ecc2181a70d8" providerId="ADAL" clId="{D8D3057E-84ED-FB4F-A611-DCCD0937339D}" dt="2024-02-14T23:54:15.243" v="146" actId="1037"/>
+          <ac:spMkLst>
+            <pc:docMk/>
+            <pc:sldMk cId="195836209" sldId="256"/>
+            <ac:spMk id="8" creationId="{482A05DA-1A51-EB9B-1247-CAE98DB561CA}"/>
           </ac:spMkLst>
         </pc:spChg>
         <pc:spChg chg="add del mod">
@@ -376,7 +400,7 @@
           <a:p>
             <a:fld id="{0D1CA3F9-C225-4141-A414-327A9FBD7322}" type="datetimeFigureOut">
               <a:rPr lang="en-US" smtClean="0"/>
-              <a:t>1/21/24</a:t>
+              <a:t>2/12/24</a:t>
             </a:fld>
             <a:endParaRPr lang="en-US"/>
           </a:p>
@@ -574,7 +598,7 @@
           <a:p>
             <a:fld id="{0D1CA3F9-C225-4141-A414-327A9FBD7322}" type="datetimeFigureOut">
               <a:rPr lang="en-US" smtClean="0"/>
-              <a:t>1/21/24</a:t>
+              <a:t>2/12/24</a:t>
             </a:fld>
             <a:endParaRPr lang="en-US"/>
           </a:p>
@@ -782,7 +806,7 @@
           <a:p>
             <a:fld id="{0D1CA3F9-C225-4141-A414-327A9FBD7322}" type="datetimeFigureOut">
               <a:rPr lang="en-US" smtClean="0"/>
-              <a:t>1/21/24</a:t>
+              <a:t>2/12/24</a:t>
             </a:fld>
             <a:endParaRPr lang="en-US"/>
           </a:p>
@@ -980,7 +1004,7 @@
           <a:p>
             <a:fld id="{0D1CA3F9-C225-4141-A414-327A9FBD7322}" type="datetimeFigureOut">
               <a:rPr lang="en-US" smtClean="0"/>
-              <a:t>1/21/24</a:t>
+              <a:t>2/12/24</a:t>
             </a:fld>
             <a:endParaRPr lang="en-US"/>
           </a:p>
@@ -1255,7 +1279,7 @@
           <a:p>
             <a:fld id="{0D1CA3F9-C225-4141-A414-327A9FBD7322}" type="datetimeFigureOut">
               <a:rPr lang="en-US" smtClean="0"/>
-              <a:t>1/21/24</a:t>
+              <a:t>2/12/24</a:t>
             </a:fld>
             <a:endParaRPr lang="en-US"/>
           </a:p>
@@ -1520,7 +1544,7 @@
           <a:p>
             <a:fld id="{0D1CA3F9-C225-4141-A414-327A9FBD7322}" type="datetimeFigureOut">
               <a:rPr lang="en-US" smtClean="0"/>
-              <a:t>1/21/24</a:t>
+              <a:t>2/12/24</a:t>
             </a:fld>
             <a:endParaRPr lang="en-US"/>
           </a:p>
@@ -1932,7 +1956,7 @@
           <a:p>
             <a:fld id="{0D1CA3F9-C225-4141-A414-327A9FBD7322}" type="datetimeFigureOut">
               <a:rPr lang="en-US" smtClean="0"/>
-              <a:t>1/21/24</a:t>
+              <a:t>2/12/24</a:t>
             </a:fld>
             <a:endParaRPr lang="en-US"/>
           </a:p>
@@ -2073,7 +2097,7 @@
           <a:p>
             <a:fld id="{0D1CA3F9-C225-4141-A414-327A9FBD7322}" type="datetimeFigureOut">
               <a:rPr lang="en-US" smtClean="0"/>
-              <a:t>1/21/24</a:t>
+              <a:t>2/12/24</a:t>
             </a:fld>
             <a:endParaRPr lang="en-US"/>
           </a:p>
@@ -2186,7 +2210,7 @@
           <a:p>
             <a:fld id="{0D1CA3F9-C225-4141-A414-327A9FBD7322}" type="datetimeFigureOut">
               <a:rPr lang="en-US" smtClean="0"/>
-              <a:t>1/21/24</a:t>
+              <a:t>2/12/24</a:t>
             </a:fld>
             <a:endParaRPr lang="en-US"/>
           </a:p>
@@ -2497,7 +2521,7 @@
           <a:p>
             <a:fld id="{0D1CA3F9-C225-4141-A414-327A9FBD7322}" type="datetimeFigureOut">
               <a:rPr lang="en-US" smtClean="0"/>
-              <a:t>1/21/24</a:t>
+              <a:t>2/12/24</a:t>
             </a:fld>
             <a:endParaRPr lang="en-US"/>
           </a:p>
@@ -2785,7 +2809,7 @@
           <a:p>
             <a:fld id="{0D1CA3F9-C225-4141-A414-327A9FBD7322}" type="datetimeFigureOut">
               <a:rPr lang="en-US" smtClean="0"/>
-              <a:t>1/21/24</a:t>
+              <a:t>2/12/24</a:t>
             </a:fld>
             <a:endParaRPr lang="en-US"/>
           </a:p>
@@ -3026,7 +3050,7 @@
           <a:p>
             <a:fld id="{0D1CA3F9-C225-4141-A414-327A9FBD7322}" type="datetimeFigureOut">
               <a:rPr lang="en-US" smtClean="0"/>
-              <a:t>1/21/24</a:t>
+              <a:t>2/12/24</a:t>
             </a:fld>
             <a:endParaRPr lang="en-US"/>
           </a:p>
@@ -4478,6 +4502,195 @@
           </a:p>
         </p:txBody>
       </p:sp>
+      <p:sp>
+        <p:nvSpPr>
+          <p:cNvPr id="5" name="Rounded Rectangle 4">
+            <a:extLst>
+              <a:ext uri="{FF2B5EF4-FFF2-40B4-BE49-F238E27FC236}">
+                <a16:creationId xmlns:a16="http://schemas.microsoft.com/office/drawing/2014/main" id="{EA368D9C-2B9E-AE0A-1FA3-6898223F7DE0}"/>
+              </a:ext>
+            </a:extLst>
+          </p:cNvPr>
+          <p:cNvSpPr/>
+          <p:nvPr/>
+        </p:nvSpPr>
+        <p:spPr>
+          <a:xfrm>
+            <a:off x="506598" y="1138635"/>
+            <a:ext cx="3097754" cy="466753"/>
+          </a:xfrm>
+          <a:prstGeom prst="roundRect">
+            <a:avLst/>
+          </a:prstGeom>
+          <a:solidFill>
+            <a:srgbClr val="FF8021">
+              <a:alpha val="72941"/>
+            </a:srgbClr>
+          </a:solidFill>
+          <a:ln w="57150">
+            <a:solidFill>
+              <a:srgbClr val="FF8021"/>
+            </a:solidFill>
+          </a:ln>
+        </p:spPr>
+        <p:style>
+          <a:lnRef idx="2">
+            <a:schemeClr val="accent1">
+              <a:shade val="50000"/>
+            </a:schemeClr>
+          </a:lnRef>
+          <a:fillRef idx="1">
+            <a:schemeClr val="accent1"/>
+          </a:fillRef>
+          <a:effectRef idx="0">
+            <a:schemeClr val="accent1"/>
+          </a:effectRef>
+          <a:fontRef idx="minor">
+            <a:schemeClr val="lt1"/>
+          </a:fontRef>
+        </p:style>
+        <p:txBody>
+          <a:bodyPr rtlCol="0" anchor="ctr"/>
+          <a:lstStyle/>
+          <a:p>
+            <a:pPr algn="ctr"/>
+            <a:r>
+              <a:rPr lang="en-US" sz="2800" dirty="0">
+                <a:solidFill>
+                  <a:schemeClr val="tx1"/>
+                </a:solidFill>
+              </a:rPr>
+              <a:t>Model Selection</a:t>
+            </a:r>
+          </a:p>
+        </p:txBody>
+      </p:sp>
+      <p:sp>
+        <p:nvSpPr>
+          <p:cNvPr id="6" name="Rounded Rectangle 5">
+            <a:extLst>
+              <a:ext uri="{FF2B5EF4-FFF2-40B4-BE49-F238E27FC236}">
+                <a16:creationId xmlns:a16="http://schemas.microsoft.com/office/drawing/2014/main" id="{20B82AA9-D2FD-421E-D489-3956EB8E7AD8}"/>
+              </a:ext>
+            </a:extLst>
+          </p:cNvPr>
+          <p:cNvSpPr/>
+          <p:nvPr/>
+        </p:nvSpPr>
+        <p:spPr>
+          <a:xfrm>
+            <a:off x="4251828" y="1128678"/>
+            <a:ext cx="3097754" cy="466753"/>
+          </a:xfrm>
+          <a:prstGeom prst="roundRect">
+            <a:avLst/>
+          </a:prstGeom>
+          <a:solidFill>
+            <a:srgbClr val="34AC8B">
+              <a:alpha val="71765"/>
+            </a:srgbClr>
+          </a:solidFill>
+          <a:ln w="57150">
+            <a:solidFill>
+              <a:srgbClr val="34AC8B"/>
+            </a:solidFill>
+          </a:ln>
+        </p:spPr>
+        <p:style>
+          <a:lnRef idx="2">
+            <a:schemeClr val="accent1">
+              <a:shade val="50000"/>
+            </a:schemeClr>
+          </a:lnRef>
+          <a:fillRef idx="1">
+            <a:schemeClr val="accent1"/>
+          </a:fillRef>
+          <a:effectRef idx="0">
+            <a:schemeClr val="accent1"/>
+          </a:effectRef>
+          <a:fontRef idx="minor">
+            <a:schemeClr val="lt1"/>
+          </a:fontRef>
+        </p:style>
+        <p:txBody>
+          <a:bodyPr rtlCol="0" anchor="ctr"/>
+          <a:lstStyle/>
+          <a:p>
+            <a:pPr algn="ctr"/>
+            <a:r>
+              <a:rPr lang="en-US" sz="2800" dirty="0">
+                <a:solidFill>
+                  <a:schemeClr val="tx1"/>
+                </a:solidFill>
+              </a:rPr>
+              <a:t>Model Fitting</a:t>
+            </a:r>
+          </a:p>
+        </p:txBody>
+      </p:sp>
+      <p:sp>
+        <p:nvSpPr>
+          <p:cNvPr id="8" name="Rounded Rectangle 7">
+            <a:extLst>
+              <a:ext uri="{FF2B5EF4-FFF2-40B4-BE49-F238E27FC236}">
+                <a16:creationId xmlns:a16="http://schemas.microsoft.com/office/drawing/2014/main" id="{482A05DA-1A51-EB9B-1247-CAE98DB561CA}"/>
+              </a:ext>
+            </a:extLst>
+          </p:cNvPr>
+          <p:cNvSpPr/>
+          <p:nvPr/>
+        </p:nvSpPr>
+        <p:spPr>
+          <a:xfrm>
+            <a:off x="7974198" y="1128678"/>
+            <a:ext cx="3097754" cy="466753"/>
+          </a:xfrm>
+          <a:prstGeom prst="roundRect">
+            <a:avLst/>
+          </a:prstGeom>
+          <a:solidFill>
+            <a:srgbClr val="A7EA52">
+              <a:alpha val="74902"/>
+            </a:srgbClr>
+          </a:solidFill>
+          <a:ln w="57150">
+            <a:solidFill>
+              <a:srgbClr val="A7EA52"/>
+            </a:solidFill>
+          </a:ln>
+        </p:spPr>
+        <p:style>
+          <a:lnRef idx="2">
+            <a:schemeClr val="accent1">
+              <a:shade val="50000"/>
+            </a:schemeClr>
+          </a:lnRef>
+          <a:fillRef idx="1">
+            <a:schemeClr val="accent1"/>
+          </a:fillRef>
+          <a:effectRef idx="0">
+            <a:schemeClr val="accent1"/>
+          </a:effectRef>
+          <a:fontRef idx="minor">
+            <a:schemeClr val="lt1"/>
+          </a:fontRef>
+        </p:style>
+        <p:txBody>
+          <a:bodyPr rtlCol="0" anchor="ctr"/>
+          <a:lstStyle/>
+          <a:p>
+            <a:pPr algn="ctr"/>
+            <a:r>
+              <a:rPr lang="en-US" sz="2800" dirty="0">
+                <a:solidFill>
+                  <a:schemeClr val="tx1"/>
+                </a:solidFill>
+              </a:rPr>
+              <a:t>Model Evaluation</a:t>
+            </a:r>
+          </a:p>
+        </p:txBody>
+      </p:sp>
     </p:spTree>
     <p:extLst>
       <p:ext uri="{BB962C8B-B14F-4D97-AF65-F5344CB8AC3E}">

</xml_diff>